<commit_message>
Deployed 340313b with MkDocs version: 1.5.3
</commit_message>
<xml_diff>
--- a/ARCHITECTURE/wiring.pptx
+++ b/ARCHITECTURE/wiring.pptx
@@ -9,6 +9,7 @@
     <p:sldId id="257" r:id="rId3"/>
     <p:sldId id="258" r:id="rId4"/>
     <p:sldId id="259" r:id="rId5"/>
+    <p:sldId id="261" r:id="rId6"/>
   </p:sldIdLst>
   <p:sldSz cx="14630400" cy="10058400"/>
   <p:notesSz cx="6858000" cy="9144000"/>
@@ -7528,6 +7529,706 @@
 </p:sld>
 </file>
 
+<file path=ppt/slides/slide5.xml><?xml version="1.0" encoding="utf-8"?>
+<p:sld xmlns:a="http://schemas.openxmlformats.org/drawingml/2006/main" xmlns:r="http://schemas.openxmlformats.org/officeDocument/2006/relationships" xmlns:p="http://schemas.openxmlformats.org/presentationml/2006/main">
+  <p:cSld>
+    <p:spTree>
+      <p:nvGrpSpPr>
+        <p:cNvPr id="1" name=""/>
+        <p:cNvGrpSpPr/>
+        <p:nvPr/>
+      </p:nvGrpSpPr>
+      <p:grpSpPr>
+        <a:xfrm>
+          <a:off x="0" y="0"/>
+          <a:ext cx="0" cy="0"/>
+          <a:chOff x="0" y="0"/>
+          <a:chExt cx="0" cy="0"/>
+        </a:xfrm>
+      </p:grpSpPr>
+      <p:sp>
+        <p:nvSpPr>
+          <p:cNvPr id="2" name="Rectangle 1">
+            <a:extLst>
+              <a:ext uri="{FF2B5EF4-FFF2-40B4-BE49-F238E27FC236}">
+                <a16:creationId xmlns:a16="http://schemas.microsoft.com/office/drawing/2014/main" id="{B2F0B369-72F4-7EF4-79FC-0A9AF1C00678}"/>
+              </a:ext>
+            </a:extLst>
+          </p:cNvPr>
+          <p:cNvSpPr/>
+          <p:nvPr/>
+        </p:nvSpPr>
+        <p:spPr>
+          <a:xfrm>
+            <a:off x="5518150" y="3730870"/>
+            <a:ext cx="8154632" cy="5349629"/>
+          </a:xfrm>
+          <a:prstGeom prst="rect">
+            <a:avLst/>
+          </a:prstGeom>
+          <a:solidFill>
+            <a:schemeClr val="bg1"/>
+          </a:solidFill>
+          <a:ln>
+            <a:noFill/>
+          </a:ln>
+        </p:spPr>
+        <p:style>
+          <a:lnRef idx="2">
+            <a:schemeClr val="accent1">
+              <a:shade val="15000"/>
+            </a:schemeClr>
+          </a:lnRef>
+          <a:fillRef idx="1">
+            <a:schemeClr val="accent1"/>
+          </a:fillRef>
+          <a:effectRef idx="0">
+            <a:schemeClr val="accent1"/>
+          </a:effectRef>
+          <a:fontRef idx="minor">
+            <a:schemeClr val="lt1"/>
+          </a:fontRef>
+        </p:style>
+        <p:txBody>
+          <a:bodyPr rtlCol="0" anchor="ctr"/>
+          <a:lstStyle/>
+          <a:p>
+            <a:pPr algn="ctr"/>
+            <a:endParaRPr lang="en-US"/>
+          </a:p>
+        </p:txBody>
+      </p:sp>
+      <p:grpSp>
+        <p:nvGrpSpPr>
+          <p:cNvPr id="7" name="Group 6">
+            <a:extLst>
+              <a:ext uri="{FF2B5EF4-FFF2-40B4-BE49-F238E27FC236}">
+                <a16:creationId xmlns:a16="http://schemas.microsoft.com/office/drawing/2014/main" id="{59A7B217-49C3-85BA-7E75-0D8CB521F900}"/>
+              </a:ext>
+            </a:extLst>
+          </p:cNvPr>
+          <p:cNvGrpSpPr/>
+          <p:nvPr/>
+        </p:nvGrpSpPr>
+        <p:grpSpPr>
+          <a:xfrm>
+            <a:off x="5865073" y="5368676"/>
+            <a:ext cx="5958840" cy="2935712"/>
+            <a:chOff x="901700" y="781051"/>
+            <a:chExt cx="10388600" cy="5118100"/>
+          </a:xfrm>
+        </p:grpSpPr>
+        <p:pic>
+          <p:nvPicPr>
+            <p:cNvPr id="5" name="Picture 4" descr="A black circuit board with yellow lights&#10;&#10;Description automatically generated">
+              <a:extLst>
+                <a:ext uri="{FF2B5EF4-FFF2-40B4-BE49-F238E27FC236}">
+                  <a16:creationId xmlns:a16="http://schemas.microsoft.com/office/drawing/2014/main" id="{F55A229A-A3CB-F92D-4BD6-DA3025BECACB}"/>
+                </a:ext>
+              </a:extLst>
+            </p:cNvPr>
+            <p:cNvPicPr>
+              <a:picLocks noChangeAspect="1"/>
+            </p:cNvPicPr>
+            <p:nvPr/>
+          </p:nvPicPr>
+          <p:blipFill rotWithShape="1">
+            <a:blip r:embed="rId2" cstate="print">
+              <a:extLst>
+                <a:ext uri="{28A0092B-C50C-407E-A947-70E740481C1C}">
+                  <a14:useLocalDpi xmlns:a14="http://schemas.microsoft.com/office/drawing/2010/main" val="0"/>
+                </a:ext>
+              </a:extLst>
+            </a:blip>
+            <a:srcRect l="15396" t="11010" b="10426"/>
+            <a:stretch/>
+          </p:blipFill>
+          <p:spPr>
+            <a:xfrm>
+              <a:off x="975360" y="781051"/>
+              <a:ext cx="10314940" cy="5118100"/>
+            </a:xfrm>
+            <a:prstGeom prst="rect">
+              <a:avLst/>
+            </a:prstGeom>
+          </p:spPr>
+        </p:pic>
+        <p:sp>
+          <p:nvSpPr>
+            <p:cNvPr id="6" name="Rectangle 5">
+              <a:extLst>
+                <a:ext uri="{FF2B5EF4-FFF2-40B4-BE49-F238E27FC236}">
+                  <a16:creationId xmlns:a16="http://schemas.microsoft.com/office/drawing/2014/main" id="{D9FCD3D4-FEC8-56A4-24F5-B5E0AAD1E55E}"/>
+                </a:ext>
+              </a:extLst>
+            </p:cNvPr>
+            <p:cNvSpPr/>
+            <p:nvPr/>
+          </p:nvSpPr>
+          <p:spPr>
+            <a:xfrm>
+              <a:off x="901700" y="3817620"/>
+              <a:ext cx="850900" cy="1150620"/>
+            </a:xfrm>
+            <a:prstGeom prst="rect">
+              <a:avLst/>
+            </a:prstGeom>
+            <a:solidFill>
+              <a:schemeClr val="bg1"/>
+            </a:solidFill>
+            <a:ln>
+              <a:noFill/>
+            </a:ln>
+          </p:spPr>
+          <p:style>
+            <a:lnRef idx="2">
+              <a:schemeClr val="accent1">
+                <a:shade val="15000"/>
+              </a:schemeClr>
+            </a:lnRef>
+            <a:fillRef idx="1">
+              <a:schemeClr val="accent1"/>
+            </a:fillRef>
+            <a:effectRef idx="0">
+              <a:schemeClr val="accent1"/>
+            </a:effectRef>
+            <a:fontRef idx="minor">
+              <a:schemeClr val="lt1"/>
+            </a:fontRef>
+          </p:style>
+          <p:txBody>
+            <a:bodyPr rtlCol="0" anchor="ctr"/>
+            <a:lstStyle/>
+            <a:p>
+              <a:pPr algn="ctr"/>
+              <a:endParaRPr lang="en-US" sz="2160"/>
+            </a:p>
+          </p:txBody>
+        </p:sp>
+      </p:grpSp>
+      <p:cxnSp>
+        <p:nvCxnSpPr>
+          <p:cNvPr id="61" name="Straight Connector 60">
+            <a:extLst>
+              <a:ext uri="{FF2B5EF4-FFF2-40B4-BE49-F238E27FC236}">
+                <a16:creationId xmlns:a16="http://schemas.microsoft.com/office/drawing/2014/main" id="{AA17BF95-73D5-0DB3-FEAA-86375D3CE7BE}"/>
+              </a:ext>
+            </a:extLst>
+          </p:cNvPr>
+          <p:cNvCxnSpPr>
+            <a:cxnSpLocks/>
+          </p:cNvCxnSpPr>
+          <p:nvPr/>
+        </p:nvCxnSpPr>
+        <p:spPr>
+          <a:xfrm flipV="1">
+            <a:off x="2781300" y="4270248"/>
+            <a:ext cx="208415" cy="201797"/>
+          </a:xfrm>
+          <a:prstGeom prst="line">
+            <a:avLst/>
+          </a:prstGeom>
+          <a:ln w="28575">
+            <a:solidFill>
+              <a:srgbClr val="FF0000"/>
+            </a:solidFill>
+          </a:ln>
+        </p:spPr>
+        <p:style>
+          <a:lnRef idx="1">
+            <a:schemeClr val="accent1"/>
+          </a:lnRef>
+          <a:fillRef idx="0">
+            <a:schemeClr val="accent1"/>
+          </a:fillRef>
+          <a:effectRef idx="0">
+            <a:schemeClr val="accent1"/>
+          </a:effectRef>
+          <a:fontRef idx="minor">
+            <a:schemeClr val="tx1"/>
+          </a:fontRef>
+        </p:style>
+      </p:cxnSp>
+      <p:cxnSp>
+        <p:nvCxnSpPr>
+          <p:cNvPr id="1025" name="Straight Connector 1024">
+            <a:extLst>
+              <a:ext uri="{FF2B5EF4-FFF2-40B4-BE49-F238E27FC236}">
+                <a16:creationId xmlns:a16="http://schemas.microsoft.com/office/drawing/2014/main" id="{7BF7A71F-CC7F-9C46-0847-0EFE6D8FBCC6}"/>
+              </a:ext>
+            </a:extLst>
+          </p:cNvPr>
+          <p:cNvCxnSpPr>
+            <a:cxnSpLocks/>
+          </p:cNvCxnSpPr>
+          <p:nvPr/>
+        </p:nvCxnSpPr>
+        <p:spPr>
+          <a:xfrm flipH="1">
+            <a:off x="2324001" y="4462379"/>
+            <a:ext cx="476250" cy="0"/>
+          </a:xfrm>
+          <a:prstGeom prst="line">
+            <a:avLst/>
+          </a:prstGeom>
+          <a:ln w="28575">
+            <a:solidFill>
+              <a:srgbClr val="FF0000"/>
+            </a:solidFill>
+          </a:ln>
+        </p:spPr>
+        <p:style>
+          <a:lnRef idx="1">
+            <a:schemeClr val="accent1"/>
+          </a:lnRef>
+          <a:fillRef idx="0">
+            <a:schemeClr val="accent1"/>
+          </a:fillRef>
+          <a:effectRef idx="0">
+            <a:schemeClr val="accent1"/>
+          </a:effectRef>
+          <a:fontRef idx="minor">
+            <a:schemeClr val="tx1"/>
+          </a:fontRef>
+        </p:style>
+      </p:cxnSp>
+      <p:cxnSp>
+        <p:nvCxnSpPr>
+          <p:cNvPr id="1027" name="Straight Connector 1026">
+            <a:extLst>
+              <a:ext uri="{FF2B5EF4-FFF2-40B4-BE49-F238E27FC236}">
+                <a16:creationId xmlns:a16="http://schemas.microsoft.com/office/drawing/2014/main" id="{4539EEDF-6D2F-84DD-D0FD-2D7E2F739BFD}"/>
+              </a:ext>
+            </a:extLst>
+          </p:cNvPr>
+          <p:cNvCxnSpPr>
+            <a:cxnSpLocks/>
+          </p:cNvCxnSpPr>
+          <p:nvPr/>
+        </p:nvCxnSpPr>
+        <p:spPr>
+          <a:xfrm flipH="1">
+            <a:off x="2328764" y="4687290"/>
+            <a:ext cx="727639" cy="0"/>
+          </a:xfrm>
+          <a:prstGeom prst="line">
+            <a:avLst/>
+          </a:prstGeom>
+          <a:ln w="28575">
+            <a:solidFill>
+              <a:schemeClr val="tx1"/>
+            </a:solidFill>
+          </a:ln>
+        </p:spPr>
+        <p:style>
+          <a:lnRef idx="1">
+            <a:schemeClr val="accent1"/>
+          </a:lnRef>
+          <a:fillRef idx="0">
+            <a:schemeClr val="accent1"/>
+          </a:fillRef>
+          <a:effectRef idx="0">
+            <a:schemeClr val="accent1"/>
+          </a:effectRef>
+          <a:fontRef idx="minor">
+            <a:schemeClr val="tx1"/>
+          </a:fontRef>
+        </p:style>
+      </p:cxnSp>
+      <p:sp>
+        <p:nvSpPr>
+          <p:cNvPr id="1028" name="TextBox 1027">
+            <a:extLst>
+              <a:ext uri="{FF2B5EF4-FFF2-40B4-BE49-F238E27FC236}">
+                <a16:creationId xmlns:a16="http://schemas.microsoft.com/office/drawing/2014/main" id="{8D5B43F3-AA8B-4552-E661-91C918E76E20}"/>
+              </a:ext>
+            </a:extLst>
+          </p:cNvPr>
+          <p:cNvSpPr txBox="1"/>
+          <p:nvPr/>
+        </p:nvSpPr>
+        <p:spPr>
+          <a:xfrm>
+            <a:off x="1773542" y="4255476"/>
+            <a:ext cx="535468" cy="350865"/>
+          </a:xfrm>
+          <a:prstGeom prst="rect">
+            <a:avLst/>
+          </a:prstGeom>
+          <a:noFill/>
+        </p:spPr>
+        <p:txBody>
+          <a:bodyPr wrap="none" rtlCol="0">
+            <a:spAutoFit/>
+          </a:bodyPr>
+          <a:lstStyle/>
+          <a:p>
+            <a:r>
+              <a:rPr lang="en-US" sz="1680" b="1" dirty="0">
+                <a:solidFill>
+                  <a:srgbClr val="FF0000"/>
+                </a:solidFill>
+              </a:rPr>
+              <a:t>VCC</a:t>
+            </a:r>
+          </a:p>
+        </p:txBody>
+      </p:sp>
+      <p:sp>
+        <p:nvSpPr>
+          <p:cNvPr id="1029" name="TextBox 1028">
+            <a:extLst>
+              <a:ext uri="{FF2B5EF4-FFF2-40B4-BE49-F238E27FC236}">
+                <a16:creationId xmlns:a16="http://schemas.microsoft.com/office/drawing/2014/main" id="{3EBCC962-FE51-9CA9-AFA2-C84050C6D899}"/>
+              </a:ext>
+            </a:extLst>
+          </p:cNvPr>
+          <p:cNvSpPr txBox="1"/>
+          <p:nvPr/>
+        </p:nvSpPr>
+        <p:spPr>
+          <a:xfrm>
+            <a:off x="1773542" y="4505834"/>
+            <a:ext cx="601447" cy="350865"/>
+          </a:xfrm>
+          <a:prstGeom prst="rect">
+            <a:avLst/>
+          </a:prstGeom>
+          <a:noFill/>
+        </p:spPr>
+        <p:txBody>
+          <a:bodyPr wrap="none" rtlCol="0">
+            <a:spAutoFit/>
+          </a:bodyPr>
+          <a:lstStyle/>
+          <a:p>
+            <a:r>
+              <a:rPr lang="en-US" sz="1680" b="1" dirty="0"/>
+              <a:t>GND</a:t>
+            </a:r>
+          </a:p>
+        </p:txBody>
+      </p:sp>
+      <p:cxnSp>
+        <p:nvCxnSpPr>
+          <p:cNvPr id="1036" name="Straight Connector 1035">
+            <a:extLst>
+              <a:ext uri="{FF2B5EF4-FFF2-40B4-BE49-F238E27FC236}">
+                <a16:creationId xmlns:a16="http://schemas.microsoft.com/office/drawing/2014/main" id="{A1DC0953-7F2A-6206-C071-E9DFD3BB8D61}"/>
+              </a:ext>
+            </a:extLst>
+          </p:cNvPr>
+          <p:cNvCxnSpPr>
+            <a:cxnSpLocks/>
+          </p:cNvCxnSpPr>
+          <p:nvPr/>
+        </p:nvCxnSpPr>
+        <p:spPr>
+          <a:xfrm flipV="1">
+            <a:off x="3031863" y="4284909"/>
+            <a:ext cx="411217" cy="401056"/>
+          </a:xfrm>
+          <a:prstGeom prst="line">
+            <a:avLst/>
+          </a:prstGeom>
+          <a:ln w="28575">
+            <a:solidFill>
+              <a:schemeClr val="tx1"/>
+            </a:solidFill>
+          </a:ln>
+        </p:spPr>
+        <p:style>
+          <a:lnRef idx="1">
+            <a:schemeClr val="accent1"/>
+          </a:lnRef>
+          <a:fillRef idx="0">
+            <a:schemeClr val="accent1"/>
+          </a:fillRef>
+          <a:effectRef idx="0">
+            <a:schemeClr val="accent1"/>
+          </a:effectRef>
+          <a:fontRef idx="minor">
+            <a:schemeClr val="tx1"/>
+          </a:fontRef>
+        </p:style>
+      </p:cxnSp>
+      <p:sp>
+        <p:nvSpPr>
+          <p:cNvPr id="1043" name="Oval 1042">
+            <a:extLst>
+              <a:ext uri="{FF2B5EF4-FFF2-40B4-BE49-F238E27FC236}">
+                <a16:creationId xmlns:a16="http://schemas.microsoft.com/office/drawing/2014/main" id="{4119862D-5F4C-E1B9-B500-1A8B83694866}"/>
+              </a:ext>
+            </a:extLst>
+          </p:cNvPr>
+          <p:cNvSpPr/>
+          <p:nvPr/>
+        </p:nvSpPr>
+        <p:spPr>
+          <a:xfrm>
+            <a:off x="7035453" y="5465251"/>
+            <a:ext cx="153202" cy="153202"/>
+          </a:xfrm>
+          <a:prstGeom prst="ellipse">
+            <a:avLst/>
+          </a:prstGeom>
+          <a:solidFill>
+            <a:srgbClr val="FF0000"/>
+          </a:solidFill>
+          <a:ln>
+            <a:noFill/>
+          </a:ln>
+        </p:spPr>
+        <p:style>
+          <a:lnRef idx="2">
+            <a:schemeClr val="accent1">
+              <a:shade val="15000"/>
+            </a:schemeClr>
+          </a:lnRef>
+          <a:fillRef idx="1">
+            <a:schemeClr val="accent1"/>
+          </a:fillRef>
+          <a:effectRef idx="0">
+            <a:schemeClr val="accent1"/>
+          </a:effectRef>
+          <a:fontRef idx="minor">
+            <a:schemeClr val="lt1"/>
+          </a:fontRef>
+        </p:style>
+        <p:txBody>
+          <a:bodyPr rtlCol="0" anchor="ctr"/>
+          <a:lstStyle/>
+          <a:p>
+            <a:pPr algn="ctr"/>
+            <a:endParaRPr lang="en-US" sz="2160">
+              <a:solidFill>
+                <a:srgbClr val="FF0000"/>
+              </a:solidFill>
+            </a:endParaRPr>
+          </a:p>
+        </p:txBody>
+      </p:sp>
+      <p:sp>
+        <p:nvSpPr>
+          <p:cNvPr id="1044" name="TextBox 1043">
+            <a:extLst>
+              <a:ext uri="{FF2B5EF4-FFF2-40B4-BE49-F238E27FC236}">
+                <a16:creationId xmlns:a16="http://schemas.microsoft.com/office/drawing/2014/main" id="{D09B125A-554C-E167-8820-4EDE78B8883C}"/>
+              </a:ext>
+            </a:extLst>
+          </p:cNvPr>
+          <p:cNvSpPr txBox="1"/>
+          <p:nvPr/>
+        </p:nvSpPr>
+        <p:spPr>
+          <a:xfrm>
+            <a:off x="7269156" y="5034490"/>
+            <a:ext cx="633315" cy="350865"/>
+          </a:xfrm>
+          <a:prstGeom prst="rect">
+            <a:avLst/>
+          </a:prstGeom>
+          <a:noFill/>
+          <a:ln>
+            <a:solidFill>
+              <a:srgbClr val="FF0000"/>
+            </a:solidFill>
+          </a:ln>
+        </p:spPr>
+        <p:txBody>
+          <a:bodyPr wrap="none" rtlCol="0">
+            <a:spAutoFit/>
+          </a:bodyPr>
+          <a:lstStyle/>
+          <a:p>
+            <a:r>
+              <a:rPr lang="en-US" sz="1680" b="1" dirty="0">
+                <a:solidFill>
+                  <a:srgbClr val="FF0000"/>
+                </a:solidFill>
+              </a:rPr>
+              <a:t>PA12</a:t>
+            </a:r>
+          </a:p>
+        </p:txBody>
+      </p:sp>
+      <p:cxnSp>
+        <p:nvCxnSpPr>
+          <p:cNvPr id="1045" name="Straight Connector 1044">
+            <a:extLst>
+              <a:ext uri="{FF2B5EF4-FFF2-40B4-BE49-F238E27FC236}">
+                <a16:creationId xmlns:a16="http://schemas.microsoft.com/office/drawing/2014/main" id="{F823C96F-40D0-3962-B082-93CE7EE9DD19}"/>
+              </a:ext>
+            </a:extLst>
+          </p:cNvPr>
+          <p:cNvCxnSpPr>
+            <a:cxnSpLocks/>
+          </p:cNvCxnSpPr>
+          <p:nvPr/>
+        </p:nvCxnSpPr>
+        <p:spPr>
+          <a:xfrm>
+            <a:off x="6576749" y="4914777"/>
+            <a:ext cx="578687" cy="640032"/>
+          </a:xfrm>
+          <a:prstGeom prst="line">
+            <a:avLst/>
+          </a:prstGeom>
+          <a:ln w="28575">
+            <a:solidFill>
+              <a:srgbClr val="FF0000"/>
+            </a:solidFill>
+          </a:ln>
+        </p:spPr>
+        <p:style>
+          <a:lnRef idx="1">
+            <a:schemeClr val="accent1"/>
+          </a:lnRef>
+          <a:fillRef idx="0">
+            <a:schemeClr val="accent1"/>
+          </a:fillRef>
+          <a:effectRef idx="0">
+            <a:schemeClr val="accent1"/>
+          </a:effectRef>
+          <a:fontRef idx="minor">
+            <a:schemeClr val="tx1"/>
+          </a:fontRef>
+        </p:style>
+      </p:cxnSp>
+      <p:cxnSp>
+        <p:nvCxnSpPr>
+          <p:cNvPr id="1057" name="Straight Connector 1056">
+            <a:extLst>
+              <a:ext uri="{FF2B5EF4-FFF2-40B4-BE49-F238E27FC236}">
+                <a16:creationId xmlns:a16="http://schemas.microsoft.com/office/drawing/2014/main" id="{B6235BE8-954E-FB0F-9A9F-5588B128B8AF}"/>
+              </a:ext>
+            </a:extLst>
+          </p:cNvPr>
+          <p:cNvCxnSpPr>
+            <a:cxnSpLocks/>
+          </p:cNvCxnSpPr>
+          <p:nvPr/>
+        </p:nvCxnSpPr>
+        <p:spPr>
+          <a:xfrm flipH="1">
+            <a:off x="3741032" y="4914778"/>
+            <a:ext cx="2843918" cy="0"/>
+          </a:xfrm>
+          <a:prstGeom prst="line">
+            <a:avLst/>
+          </a:prstGeom>
+          <a:ln w="28575">
+            <a:solidFill>
+              <a:srgbClr val="FF0000"/>
+            </a:solidFill>
+          </a:ln>
+        </p:spPr>
+        <p:style>
+          <a:lnRef idx="1">
+            <a:schemeClr val="accent1"/>
+          </a:lnRef>
+          <a:fillRef idx="0">
+            <a:schemeClr val="accent1"/>
+          </a:fillRef>
+          <a:effectRef idx="0">
+            <a:schemeClr val="accent1"/>
+          </a:effectRef>
+          <a:fontRef idx="minor">
+            <a:schemeClr val="tx1"/>
+          </a:fontRef>
+        </p:style>
+      </p:cxnSp>
+      <p:cxnSp>
+        <p:nvCxnSpPr>
+          <p:cNvPr id="1059" name="Straight Connector 1058">
+            <a:extLst>
+              <a:ext uri="{FF2B5EF4-FFF2-40B4-BE49-F238E27FC236}">
+                <a16:creationId xmlns:a16="http://schemas.microsoft.com/office/drawing/2014/main" id="{DAC7E834-8BE0-C322-7B1C-B905615FD59C}"/>
+              </a:ext>
+            </a:extLst>
+          </p:cNvPr>
+          <p:cNvCxnSpPr>
+            <a:cxnSpLocks/>
+          </p:cNvCxnSpPr>
+          <p:nvPr/>
+        </p:nvCxnSpPr>
+        <p:spPr>
+          <a:xfrm>
+            <a:off x="3170546" y="4227873"/>
+            <a:ext cx="570486" cy="686905"/>
+          </a:xfrm>
+          <a:prstGeom prst="line">
+            <a:avLst/>
+          </a:prstGeom>
+          <a:ln w="28575">
+            <a:solidFill>
+              <a:srgbClr val="FF0000"/>
+            </a:solidFill>
+          </a:ln>
+        </p:spPr>
+        <p:style>
+          <a:lnRef idx="1">
+            <a:schemeClr val="accent1"/>
+          </a:lnRef>
+          <a:fillRef idx="0">
+            <a:schemeClr val="accent1"/>
+          </a:fillRef>
+          <a:effectRef idx="0">
+            <a:schemeClr val="accent1"/>
+          </a:effectRef>
+          <a:fontRef idx="minor">
+            <a:schemeClr val="tx1"/>
+          </a:fontRef>
+        </p:style>
+      </p:cxnSp>
+      <p:pic>
+        <p:nvPicPr>
+          <p:cNvPr id="8" name="Picture 7" descr="A close up of a device&#10;&#10;Description automatically generated">
+            <a:extLst>
+              <a:ext uri="{FF2B5EF4-FFF2-40B4-BE49-F238E27FC236}">
+                <a16:creationId xmlns:a16="http://schemas.microsoft.com/office/drawing/2014/main" id="{EE7BF120-E91B-62BD-1A64-A380B887A3A2}"/>
+              </a:ext>
+            </a:extLst>
+          </p:cNvPr>
+          <p:cNvPicPr>
+            <a:picLocks noChangeAspect="1"/>
+          </p:cNvPicPr>
+          <p:nvPr/>
+        </p:nvPicPr>
+        <p:blipFill rotWithShape="1">
+          <a:blip r:embed="rId3">
+            <a:extLst>
+              <a:ext uri="{28A0092B-C50C-407E-A947-70E740481C1C}">
+                <a14:useLocalDpi xmlns:a14="http://schemas.microsoft.com/office/drawing/2010/main" val="0"/>
+              </a:ext>
+            </a:extLst>
+          </a:blip>
+          <a:srcRect l="13939" r="15099"/>
+          <a:stretch/>
+        </p:blipFill>
+        <p:spPr>
+          <a:xfrm rot="5400000">
+            <a:off x="1369639" y="1825352"/>
+            <a:ext cx="3510963" cy="1670323"/>
+          </a:xfrm>
+          <a:prstGeom prst="rect">
+            <a:avLst/>
+          </a:prstGeom>
+        </p:spPr>
+      </p:pic>
+    </p:spTree>
+    <p:extLst>
+      <p:ext uri="{BB962C8B-B14F-4D97-AF65-F5344CB8AC3E}">
+        <p14:creationId xmlns:p14="http://schemas.microsoft.com/office/powerpoint/2010/main" val="114658771"/>
+      </p:ext>
+    </p:extLst>
+  </p:cSld>
+  <p:clrMapOvr>
+    <a:masterClrMapping/>
+  </p:clrMapOvr>
+</p:sld>
+</file>
+
 <file path=ppt/theme/theme1.xml><?xml version="1.0" encoding="utf-8"?>
 <a:theme xmlns:a="http://schemas.openxmlformats.org/drawingml/2006/main" name="Office 2013 - 2022 Theme">
   <a:themeElements>

</xml_diff>

<commit_message>
Deployed e72c2de with MkDocs version: 1.5.3
</commit_message>
<xml_diff>
--- a/ARCHITECTURE/wiring.pptx
+++ b/ARCHITECTURE/wiring.pptx
@@ -10,6 +10,7 @@
     <p:sldId id="258" r:id="rId4"/>
     <p:sldId id="259" r:id="rId5"/>
     <p:sldId id="261" r:id="rId6"/>
+    <p:sldId id="262" r:id="rId7"/>
   </p:sldIdLst>
   <p:sldSz cx="14630400" cy="10058400"/>
   <p:notesSz cx="6858000" cy="9144000"/>
@@ -7560,8 +7561,8 @@
         </p:nvSpPr>
         <p:spPr>
           <a:xfrm>
-            <a:off x="5518150" y="3730870"/>
-            <a:ext cx="8154632" cy="5349629"/>
+            <a:off x="973667" y="550334"/>
+            <a:ext cx="12699115" cy="8530166"/>
           </a:xfrm>
           <a:prstGeom prst="rect">
             <a:avLst/>
@@ -8030,9 +8031,7 @@
           </a:prstGeom>
           <a:noFill/>
           <a:ln>
-            <a:solidFill>
-              <a:srgbClr val="FF0000"/>
-            </a:solidFill>
+            <a:noFill/>
           </a:ln>
         </p:spPr>
         <p:txBody>
@@ -8220,6 +8219,707 @@
     <p:extLst>
       <p:ext uri="{BB962C8B-B14F-4D97-AF65-F5344CB8AC3E}">
         <p14:creationId xmlns:p14="http://schemas.microsoft.com/office/powerpoint/2010/main" val="114658771"/>
+      </p:ext>
+    </p:extLst>
+  </p:cSld>
+  <p:clrMapOvr>
+    <a:masterClrMapping/>
+  </p:clrMapOvr>
+</p:sld>
+</file>
+
+<file path=ppt/slides/slide6.xml><?xml version="1.0" encoding="utf-8"?>
+<p:sld xmlns:a="http://schemas.openxmlformats.org/drawingml/2006/main" xmlns:r="http://schemas.openxmlformats.org/officeDocument/2006/relationships" xmlns:p="http://schemas.openxmlformats.org/presentationml/2006/main">
+  <p:cSld>
+    <p:spTree>
+      <p:nvGrpSpPr>
+        <p:cNvPr id="1" name=""/>
+        <p:cNvGrpSpPr/>
+        <p:nvPr/>
+      </p:nvGrpSpPr>
+      <p:grpSpPr>
+        <a:xfrm>
+          <a:off x="0" y="0"/>
+          <a:ext cx="0" cy="0"/>
+          <a:chOff x="0" y="0"/>
+          <a:chExt cx="0" cy="0"/>
+        </a:xfrm>
+      </p:grpSpPr>
+      <p:sp>
+        <p:nvSpPr>
+          <p:cNvPr id="2" name="Rectangle 1">
+            <a:extLst>
+              <a:ext uri="{FF2B5EF4-FFF2-40B4-BE49-F238E27FC236}">
+                <a16:creationId xmlns:a16="http://schemas.microsoft.com/office/drawing/2014/main" id="{B2F0B369-72F4-7EF4-79FC-0A9AF1C00678}"/>
+              </a:ext>
+            </a:extLst>
+          </p:cNvPr>
+          <p:cNvSpPr/>
+          <p:nvPr/>
+        </p:nvSpPr>
+        <p:spPr>
+          <a:xfrm>
+            <a:off x="846667" y="821268"/>
+            <a:ext cx="12826115" cy="8259232"/>
+          </a:xfrm>
+          <a:prstGeom prst="rect">
+            <a:avLst/>
+          </a:prstGeom>
+          <a:solidFill>
+            <a:schemeClr val="bg1"/>
+          </a:solidFill>
+          <a:ln>
+            <a:noFill/>
+          </a:ln>
+        </p:spPr>
+        <p:style>
+          <a:lnRef idx="2">
+            <a:schemeClr val="accent1">
+              <a:shade val="15000"/>
+            </a:schemeClr>
+          </a:lnRef>
+          <a:fillRef idx="1">
+            <a:schemeClr val="accent1"/>
+          </a:fillRef>
+          <a:effectRef idx="0">
+            <a:schemeClr val="accent1"/>
+          </a:effectRef>
+          <a:fontRef idx="minor">
+            <a:schemeClr val="lt1"/>
+          </a:fontRef>
+        </p:style>
+        <p:txBody>
+          <a:bodyPr rtlCol="0" anchor="ctr"/>
+          <a:lstStyle/>
+          <a:p>
+            <a:pPr algn="ctr"/>
+            <a:endParaRPr lang="en-US"/>
+          </a:p>
+        </p:txBody>
+      </p:sp>
+      <p:grpSp>
+        <p:nvGrpSpPr>
+          <p:cNvPr id="7" name="Group 6">
+            <a:extLst>
+              <a:ext uri="{FF2B5EF4-FFF2-40B4-BE49-F238E27FC236}">
+                <a16:creationId xmlns:a16="http://schemas.microsoft.com/office/drawing/2014/main" id="{59A7B217-49C3-85BA-7E75-0D8CB521F900}"/>
+              </a:ext>
+            </a:extLst>
+          </p:cNvPr>
+          <p:cNvGrpSpPr/>
+          <p:nvPr/>
+        </p:nvGrpSpPr>
+        <p:grpSpPr>
+          <a:xfrm>
+            <a:off x="5865073" y="5368676"/>
+            <a:ext cx="5958840" cy="2935712"/>
+            <a:chOff x="901700" y="781051"/>
+            <a:chExt cx="10388600" cy="5118100"/>
+          </a:xfrm>
+        </p:grpSpPr>
+        <p:pic>
+          <p:nvPicPr>
+            <p:cNvPr id="5" name="Picture 4" descr="A black circuit board with yellow lights&#10;&#10;Description automatically generated">
+              <a:extLst>
+                <a:ext uri="{FF2B5EF4-FFF2-40B4-BE49-F238E27FC236}">
+                  <a16:creationId xmlns:a16="http://schemas.microsoft.com/office/drawing/2014/main" id="{F55A229A-A3CB-F92D-4BD6-DA3025BECACB}"/>
+                </a:ext>
+              </a:extLst>
+            </p:cNvPr>
+            <p:cNvPicPr>
+              <a:picLocks noChangeAspect="1"/>
+            </p:cNvPicPr>
+            <p:nvPr/>
+          </p:nvPicPr>
+          <p:blipFill rotWithShape="1">
+            <a:blip r:embed="rId2" cstate="print">
+              <a:extLst>
+                <a:ext uri="{28A0092B-C50C-407E-A947-70E740481C1C}">
+                  <a14:useLocalDpi xmlns:a14="http://schemas.microsoft.com/office/drawing/2010/main" val="0"/>
+                </a:ext>
+              </a:extLst>
+            </a:blip>
+            <a:srcRect l="15396" t="11010" b="10426"/>
+            <a:stretch/>
+          </p:blipFill>
+          <p:spPr>
+            <a:xfrm>
+              <a:off x="975360" y="781051"/>
+              <a:ext cx="10314940" cy="5118100"/>
+            </a:xfrm>
+            <a:prstGeom prst="rect">
+              <a:avLst/>
+            </a:prstGeom>
+          </p:spPr>
+        </p:pic>
+        <p:sp>
+          <p:nvSpPr>
+            <p:cNvPr id="6" name="Rectangle 5">
+              <a:extLst>
+                <a:ext uri="{FF2B5EF4-FFF2-40B4-BE49-F238E27FC236}">
+                  <a16:creationId xmlns:a16="http://schemas.microsoft.com/office/drawing/2014/main" id="{D9FCD3D4-FEC8-56A4-24F5-B5E0AAD1E55E}"/>
+                </a:ext>
+              </a:extLst>
+            </p:cNvPr>
+            <p:cNvSpPr/>
+            <p:nvPr/>
+          </p:nvSpPr>
+          <p:spPr>
+            <a:xfrm>
+              <a:off x="901700" y="3817620"/>
+              <a:ext cx="850900" cy="1150620"/>
+            </a:xfrm>
+            <a:prstGeom prst="rect">
+              <a:avLst/>
+            </a:prstGeom>
+            <a:solidFill>
+              <a:schemeClr val="bg1"/>
+            </a:solidFill>
+            <a:ln>
+              <a:noFill/>
+            </a:ln>
+          </p:spPr>
+          <p:style>
+            <a:lnRef idx="2">
+              <a:schemeClr val="accent1">
+                <a:shade val="15000"/>
+              </a:schemeClr>
+            </a:lnRef>
+            <a:fillRef idx="1">
+              <a:schemeClr val="accent1"/>
+            </a:fillRef>
+            <a:effectRef idx="0">
+              <a:schemeClr val="accent1"/>
+            </a:effectRef>
+            <a:fontRef idx="minor">
+              <a:schemeClr val="lt1"/>
+            </a:fontRef>
+          </p:style>
+          <p:txBody>
+            <a:bodyPr rtlCol="0" anchor="ctr"/>
+            <a:lstStyle/>
+            <a:p>
+              <a:pPr algn="ctr"/>
+              <a:endParaRPr lang="en-US" sz="2160"/>
+            </a:p>
+          </p:txBody>
+        </p:sp>
+      </p:grpSp>
+      <p:cxnSp>
+        <p:nvCxnSpPr>
+          <p:cNvPr id="61" name="Straight Connector 60">
+            <a:extLst>
+              <a:ext uri="{FF2B5EF4-FFF2-40B4-BE49-F238E27FC236}">
+                <a16:creationId xmlns:a16="http://schemas.microsoft.com/office/drawing/2014/main" id="{AA17BF95-73D5-0DB3-FEAA-86375D3CE7BE}"/>
+              </a:ext>
+            </a:extLst>
+          </p:cNvPr>
+          <p:cNvCxnSpPr>
+            <a:cxnSpLocks/>
+          </p:cNvCxnSpPr>
+          <p:nvPr/>
+        </p:nvCxnSpPr>
+        <p:spPr>
+          <a:xfrm flipV="1">
+            <a:off x="2781300" y="4270248"/>
+            <a:ext cx="208415" cy="201797"/>
+          </a:xfrm>
+          <a:prstGeom prst="line">
+            <a:avLst/>
+          </a:prstGeom>
+          <a:ln w="28575">
+            <a:solidFill>
+              <a:srgbClr val="FF0000"/>
+            </a:solidFill>
+          </a:ln>
+        </p:spPr>
+        <p:style>
+          <a:lnRef idx="1">
+            <a:schemeClr val="accent1"/>
+          </a:lnRef>
+          <a:fillRef idx="0">
+            <a:schemeClr val="accent1"/>
+          </a:fillRef>
+          <a:effectRef idx="0">
+            <a:schemeClr val="accent1"/>
+          </a:effectRef>
+          <a:fontRef idx="minor">
+            <a:schemeClr val="tx1"/>
+          </a:fontRef>
+        </p:style>
+      </p:cxnSp>
+      <p:cxnSp>
+        <p:nvCxnSpPr>
+          <p:cNvPr id="1025" name="Straight Connector 1024">
+            <a:extLst>
+              <a:ext uri="{FF2B5EF4-FFF2-40B4-BE49-F238E27FC236}">
+                <a16:creationId xmlns:a16="http://schemas.microsoft.com/office/drawing/2014/main" id="{7BF7A71F-CC7F-9C46-0847-0EFE6D8FBCC6}"/>
+              </a:ext>
+            </a:extLst>
+          </p:cNvPr>
+          <p:cNvCxnSpPr>
+            <a:cxnSpLocks/>
+          </p:cNvCxnSpPr>
+          <p:nvPr/>
+        </p:nvCxnSpPr>
+        <p:spPr>
+          <a:xfrm flipH="1">
+            <a:off x="2324001" y="4462379"/>
+            <a:ext cx="476250" cy="0"/>
+          </a:xfrm>
+          <a:prstGeom prst="line">
+            <a:avLst/>
+          </a:prstGeom>
+          <a:ln w="28575">
+            <a:solidFill>
+              <a:srgbClr val="FF0000"/>
+            </a:solidFill>
+          </a:ln>
+        </p:spPr>
+        <p:style>
+          <a:lnRef idx="1">
+            <a:schemeClr val="accent1"/>
+          </a:lnRef>
+          <a:fillRef idx="0">
+            <a:schemeClr val="accent1"/>
+          </a:fillRef>
+          <a:effectRef idx="0">
+            <a:schemeClr val="accent1"/>
+          </a:effectRef>
+          <a:fontRef idx="minor">
+            <a:schemeClr val="tx1"/>
+          </a:fontRef>
+        </p:style>
+      </p:cxnSp>
+      <p:cxnSp>
+        <p:nvCxnSpPr>
+          <p:cNvPr id="1027" name="Straight Connector 1026">
+            <a:extLst>
+              <a:ext uri="{FF2B5EF4-FFF2-40B4-BE49-F238E27FC236}">
+                <a16:creationId xmlns:a16="http://schemas.microsoft.com/office/drawing/2014/main" id="{4539EEDF-6D2F-84DD-D0FD-2D7E2F739BFD}"/>
+              </a:ext>
+            </a:extLst>
+          </p:cNvPr>
+          <p:cNvCxnSpPr>
+            <a:cxnSpLocks/>
+          </p:cNvCxnSpPr>
+          <p:nvPr/>
+        </p:nvCxnSpPr>
+        <p:spPr>
+          <a:xfrm flipH="1">
+            <a:off x="2328764" y="4687290"/>
+            <a:ext cx="727639" cy="0"/>
+          </a:xfrm>
+          <a:prstGeom prst="line">
+            <a:avLst/>
+          </a:prstGeom>
+          <a:ln w="28575">
+            <a:solidFill>
+              <a:schemeClr val="tx1"/>
+            </a:solidFill>
+          </a:ln>
+        </p:spPr>
+        <p:style>
+          <a:lnRef idx="1">
+            <a:schemeClr val="accent1"/>
+          </a:lnRef>
+          <a:fillRef idx="0">
+            <a:schemeClr val="accent1"/>
+          </a:fillRef>
+          <a:effectRef idx="0">
+            <a:schemeClr val="accent1"/>
+          </a:effectRef>
+          <a:fontRef idx="minor">
+            <a:schemeClr val="tx1"/>
+          </a:fontRef>
+        </p:style>
+      </p:cxnSp>
+      <p:sp>
+        <p:nvSpPr>
+          <p:cNvPr id="1028" name="TextBox 1027">
+            <a:extLst>
+              <a:ext uri="{FF2B5EF4-FFF2-40B4-BE49-F238E27FC236}">
+                <a16:creationId xmlns:a16="http://schemas.microsoft.com/office/drawing/2014/main" id="{8D5B43F3-AA8B-4552-E661-91C918E76E20}"/>
+              </a:ext>
+            </a:extLst>
+          </p:cNvPr>
+          <p:cNvSpPr txBox="1"/>
+          <p:nvPr/>
+        </p:nvSpPr>
+        <p:spPr>
+          <a:xfrm>
+            <a:off x="1773542" y="4255476"/>
+            <a:ext cx="535468" cy="350865"/>
+          </a:xfrm>
+          <a:prstGeom prst="rect">
+            <a:avLst/>
+          </a:prstGeom>
+          <a:noFill/>
+        </p:spPr>
+        <p:txBody>
+          <a:bodyPr wrap="none" rtlCol="0">
+            <a:spAutoFit/>
+          </a:bodyPr>
+          <a:lstStyle/>
+          <a:p>
+            <a:r>
+              <a:rPr lang="en-US" sz="1680" b="1" dirty="0">
+                <a:solidFill>
+                  <a:srgbClr val="FF0000"/>
+                </a:solidFill>
+              </a:rPr>
+              <a:t>VCC</a:t>
+            </a:r>
+          </a:p>
+        </p:txBody>
+      </p:sp>
+      <p:sp>
+        <p:nvSpPr>
+          <p:cNvPr id="1029" name="TextBox 1028">
+            <a:extLst>
+              <a:ext uri="{FF2B5EF4-FFF2-40B4-BE49-F238E27FC236}">
+                <a16:creationId xmlns:a16="http://schemas.microsoft.com/office/drawing/2014/main" id="{3EBCC962-FE51-9CA9-AFA2-C84050C6D899}"/>
+              </a:ext>
+            </a:extLst>
+          </p:cNvPr>
+          <p:cNvSpPr txBox="1"/>
+          <p:nvPr/>
+        </p:nvSpPr>
+        <p:spPr>
+          <a:xfrm>
+            <a:off x="1773542" y="4505834"/>
+            <a:ext cx="601447" cy="350865"/>
+          </a:xfrm>
+          <a:prstGeom prst="rect">
+            <a:avLst/>
+          </a:prstGeom>
+          <a:noFill/>
+        </p:spPr>
+        <p:txBody>
+          <a:bodyPr wrap="none" rtlCol="0">
+            <a:spAutoFit/>
+          </a:bodyPr>
+          <a:lstStyle/>
+          <a:p>
+            <a:r>
+              <a:rPr lang="en-US" sz="1680" b="1" dirty="0"/>
+              <a:t>GND</a:t>
+            </a:r>
+          </a:p>
+        </p:txBody>
+      </p:sp>
+      <p:cxnSp>
+        <p:nvCxnSpPr>
+          <p:cNvPr id="1036" name="Straight Connector 1035">
+            <a:extLst>
+              <a:ext uri="{FF2B5EF4-FFF2-40B4-BE49-F238E27FC236}">
+                <a16:creationId xmlns:a16="http://schemas.microsoft.com/office/drawing/2014/main" id="{A1DC0953-7F2A-6206-C071-E9DFD3BB8D61}"/>
+              </a:ext>
+            </a:extLst>
+          </p:cNvPr>
+          <p:cNvCxnSpPr>
+            <a:cxnSpLocks/>
+          </p:cNvCxnSpPr>
+          <p:nvPr/>
+        </p:nvCxnSpPr>
+        <p:spPr>
+          <a:xfrm flipV="1">
+            <a:off x="3031863" y="4284909"/>
+            <a:ext cx="411217" cy="401056"/>
+          </a:xfrm>
+          <a:prstGeom prst="line">
+            <a:avLst/>
+          </a:prstGeom>
+          <a:ln w="28575">
+            <a:solidFill>
+              <a:schemeClr val="tx1"/>
+            </a:solidFill>
+          </a:ln>
+        </p:spPr>
+        <p:style>
+          <a:lnRef idx="1">
+            <a:schemeClr val="accent1"/>
+          </a:lnRef>
+          <a:fillRef idx="0">
+            <a:schemeClr val="accent1"/>
+          </a:fillRef>
+          <a:effectRef idx="0">
+            <a:schemeClr val="accent1"/>
+          </a:effectRef>
+          <a:fontRef idx="minor">
+            <a:schemeClr val="tx1"/>
+          </a:fontRef>
+        </p:style>
+      </p:cxnSp>
+      <p:sp>
+        <p:nvSpPr>
+          <p:cNvPr id="1043" name="Oval 1042">
+            <a:extLst>
+              <a:ext uri="{FF2B5EF4-FFF2-40B4-BE49-F238E27FC236}">
+                <a16:creationId xmlns:a16="http://schemas.microsoft.com/office/drawing/2014/main" id="{4119862D-5F4C-E1B9-B500-1A8B83694866}"/>
+              </a:ext>
+            </a:extLst>
+          </p:cNvPr>
+          <p:cNvSpPr/>
+          <p:nvPr/>
+        </p:nvSpPr>
+        <p:spPr>
+          <a:xfrm>
+            <a:off x="7035453" y="5615813"/>
+            <a:ext cx="153202" cy="153202"/>
+          </a:xfrm>
+          <a:prstGeom prst="ellipse">
+            <a:avLst/>
+          </a:prstGeom>
+          <a:solidFill>
+            <a:srgbClr val="FF0000"/>
+          </a:solidFill>
+          <a:ln>
+            <a:noFill/>
+          </a:ln>
+        </p:spPr>
+        <p:style>
+          <a:lnRef idx="2">
+            <a:schemeClr val="accent1">
+              <a:shade val="15000"/>
+            </a:schemeClr>
+          </a:lnRef>
+          <a:fillRef idx="1">
+            <a:schemeClr val="accent1"/>
+          </a:fillRef>
+          <a:effectRef idx="0">
+            <a:schemeClr val="accent1"/>
+          </a:effectRef>
+          <a:fontRef idx="minor">
+            <a:schemeClr val="lt1"/>
+          </a:fontRef>
+        </p:style>
+        <p:txBody>
+          <a:bodyPr rtlCol="0" anchor="ctr"/>
+          <a:lstStyle/>
+          <a:p>
+            <a:pPr algn="ctr"/>
+            <a:endParaRPr lang="en-US" sz="2160">
+              <a:solidFill>
+                <a:srgbClr val="FF0000"/>
+              </a:solidFill>
+            </a:endParaRPr>
+          </a:p>
+        </p:txBody>
+      </p:sp>
+      <p:sp>
+        <p:nvSpPr>
+          <p:cNvPr id="1044" name="TextBox 1043">
+            <a:extLst>
+              <a:ext uri="{FF2B5EF4-FFF2-40B4-BE49-F238E27FC236}">
+                <a16:creationId xmlns:a16="http://schemas.microsoft.com/office/drawing/2014/main" id="{D09B125A-554C-E167-8820-4EDE78B8883C}"/>
+              </a:ext>
+            </a:extLst>
+          </p:cNvPr>
+          <p:cNvSpPr txBox="1"/>
+          <p:nvPr/>
+        </p:nvSpPr>
+        <p:spPr>
+          <a:xfrm>
+            <a:off x="7269156" y="5034490"/>
+            <a:ext cx="633315" cy="350865"/>
+          </a:xfrm>
+          <a:prstGeom prst="rect">
+            <a:avLst/>
+          </a:prstGeom>
+          <a:noFill/>
+          <a:ln>
+            <a:solidFill>
+              <a:srgbClr val="FF0000"/>
+            </a:solidFill>
+          </a:ln>
+        </p:spPr>
+        <p:txBody>
+          <a:bodyPr wrap="none" rtlCol="0">
+            <a:spAutoFit/>
+          </a:bodyPr>
+          <a:lstStyle/>
+          <a:p>
+            <a:r>
+              <a:rPr lang="en-US" sz="1680" b="1" dirty="0">
+                <a:solidFill>
+                  <a:srgbClr val="FF0000"/>
+                </a:solidFill>
+              </a:rPr>
+              <a:t>PA11</a:t>
+            </a:r>
+          </a:p>
+        </p:txBody>
+      </p:sp>
+      <p:cxnSp>
+        <p:nvCxnSpPr>
+          <p:cNvPr id="1045" name="Straight Connector 1044">
+            <a:extLst>
+              <a:ext uri="{FF2B5EF4-FFF2-40B4-BE49-F238E27FC236}">
+                <a16:creationId xmlns:a16="http://schemas.microsoft.com/office/drawing/2014/main" id="{F823C96F-40D0-3962-B082-93CE7EE9DD19}"/>
+              </a:ext>
+            </a:extLst>
+          </p:cNvPr>
+          <p:cNvCxnSpPr>
+            <a:cxnSpLocks/>
+          </p:cNvCxnSpPr>
+          <p:nvPr/>
+        </p:nvCxnSpPr>
+        <p:spPr>
+          <a:xfrm>
+            <a:off x="6584950" y="4914778"/>
+            <a:ext cx="570486" cy="790593"/>
+          </a:xfrm>
+          <a:prstGeom prst="line">
+            <a:avLst/>
+          </a:prstGeom>
+          <a:ln w="28575">
+            <a:solidFill>
+              <a:srgbClr val="FF0000"/>
+            </a:solidFill>
+          </a:ln>
+        </p:spPr>
+        <p:style>
+          <a:lnRef idx="1">
+            <a:schemeClr val="accent1"/>
+          </a:lnRef>
+          <a:fillRef idx="0">
+            <a:schemeClr val="accent1"/>
+          </a:fillRef>
+          <a:effectRef idx="0">
+            <a:schemeClr val="accent1"/>
+          </a:effectRef>
+          <a:fontRef idx="minor">
+            <a:schemeClr val="tx1"/>
+          </a:fontRef>
+        </p:style>
+      </p:cxnSp>
+      <p:cxnSp>
+        <p:nvCxnSpPr>
+          <p:cNvPr id="1057" name="Straight Connector 1056">
+            <a:extLst>
+              <a:ext uri="{FF2B5EF4-FFF2-40B4-BE49-F238E27FC236}">
+                <a16:creationId xmlns:a16="http://schemas.microsoft.com/office/drawing/2014/main" id="{B6235BE8-954E-FB0F-9A9F-5588B128B8AF}"/>
+              </a:ext>
+            </a:extLst>
+          </p:cNvPr>
+          <p:cNvCxnSpPr>
+            <a:cxnSpLocks/>
+          </p:cNvCxnSpPr>
+          <p:nvPr/>
+        </p:nvCxnSpPr>
+        <p:spPr>
+          <a:xfrm flipH="1">
+            <a:off x="3741032" y="4914778"/>
+            <a:ext cx="2843918" cy="0"/>
+          </a:xfrm>
+          <a:prstGeom prst="line">
+            <a:avLst/>
+          </a:prstGeom>
+          <a:ln w="28575">
+            <a:solidFill>
+              <a:srgbClr val="FF0000"/>
+            </a:solidFill>
+          </a:ln>
+        </p:spPr>
+        <p:style>
+          <a:lnRef idx="1">
+            <a:schemeClr val="accent1"/>
+          </a:lnRef>
+          <a:fillRef idx="0">
+            <a:schemeClr val="accent1"/>
+          </a:fillRef>
+          <a:effectRef idx="0">
+            <a:schemeClr val="accent1"/>
+          </a:effectRef>
+          <a:fontRef idx="minor">
+            <a:schemeClr val="tx1"/>
+          </a:fontRef>
+        </p:style>
+      </p:cxnSp>
+      <p:cxnSp>
+        <p:nvCxnSpPr>
+          <p:cNvPr id="1059" name="Straight Connector 1058">
+            <a:extLst>
+              <a:ext uri="{FF2B5EF4-FFF2-40B4-BE49-F238E27FC236}">
+                <a16:creationId xmlns:a16="http://schemas.microsoft.com/office/drawing/2014/main" id="{DAC7E834-8BE0-C322-7B1C-B905615FD59C}"/>
+              </a:ext>
+            </a:extLst>
+          </p:cNvPr>
+          <p:cNvCxnSpPr>
+            <a:cxnSpLocks/>
+          </p:cNvCxnSpPr>
+          <p:nvPr/>
+        </p:nvCxnSpPr>
+        <p:spPr>
+          <a:xfrm>
+            <a:off x="3170546" y="4227873"/>
+            <a:ext cx="570486" cy="686905"/>
+          </a:xfrm>
+          <a:prstGeom prst="line">
+            <a:avLst/>
+          </a:prstGeom>
+          <a:ln w="28575">
+            <a:solidFill>
+              <a:srgbClr val="FF0000"/>
+            </a:solidFill>
+          </a:ln>
+        </p:spPr>
+        <p:style>
+          <a:lnRef idx="1">
+            <a:schemeClr val="accent1"/>
+          </a:lnRef>
+          <a:fillRef idx="0">
+            <a:schemeClr val="accent1"/>
+          </a:fillRef>
+          <a:effectRef idx="0">
+            <a:schemeClr val="accent1"/>
+          </a:effectRef>
+          <a:fontRef idx="minor">
+            <a:schemeClr val="tx1"/>
+          </a:fontRef>
+        </p:style>
+      </p:cxnSp>
+      <p:pic>
+        <p:nvPicPr>
+          <p:cNvPr id="4" name="Picture 3" descr="A red button on a blue board&#10;&#10;Description automatically generated">
+            <a:extLst>
+              <a:ext uri="{FF2B5EF4-FFF2-40B4-BE49-F238E27FC236}">
+                <a16:creationId xmlns:a16="http://schemas.microsoft.com/office/drawing/2014/main" id="{0930DC3F-85B5-8EFB-1571-7FB885CD92ED}"/>
+              </a:ext>
+            </a:extLst>
+          </p:cNvPr>
+          <p:cNvPicPr>
+            <a:picLocks noChangeAspect="1"/>
+          </p:cNvPicPr>
+          <p:nvPr/>
+        </p:nvPicPr>
+        <p:blipFill>
+          <a:blip r:embed="rId3">
+            <a:extLst>
+              <a:ext uri="{28A0092B-C50C-407E-A947-70E740481C1C}">
+                <a14:useLocalDpi xmlns:a14="http://schemas.microsoft.com/office/drawing/2010/main" val="0"/>
+              </a:ext>
+            </a:extLst>
+          </a:blip>
+          <a:stretch>
+            <a:fillRect/>
+          </a:stretch>
+        </p:blipFill>
+        <p:spPr>
+          <a:xfrm>
+            <a:off x="1944439" y="1817549"/>
+            <a:ext cx="2223927" cy="2857800"/>
+          </a:xfrm>
+          <a:prstGeom prst="rect">
+            <a:avLst/>
+          </a:prstGeom>
+        </p:spPr>
+      </p:pic>
+    </p:spTree>
+    <p:extLst>
+      <p:ext uri="{BB962C8B-B14F-4D97-AF65-F5344CB8AC3E}">
+        <p14:creationId xmlns:p14="http://schemas.microsoft.com/office/powerpoint/2010/main" val="1951338098"/>
       </p:ext>
     </p:extLst>
   </p:cSld>

</xml_diff>